<commit_message>
DeveloperGuide: Fix minor errors
</commit_message>
<xml_diff>
--- a/docs/diagrams/FilterUnitActivityDiagram.pptx
+++ b/docs/diagrams/FilterUnitActivityDiagram.pptx
@@ -212,7 +212,7 @@
           <a:p>
             <a:fld id="{F5CC4B3F-88C1-4FFA-B1B6-F41C21DC6924}" type="datetimeFigureOut">
               <a:rPr lang="en-US" smtClean="0"/>
-              <a:t>11/10/2018</a:t>
+              <a:t>11/11/2018</a:t>
             </a:fld>
             <a:endParaRPr lang="en-US"/>
           </a:p>
@@ -742,7 +742,7 @@
           <a:p>
             <a:fld id="{78C97017-6FC3-485B-9764-EAC9E56C1D49}" type="datetimeFigureOut">
               <a:rPr lang="en-US" smtClean="0"/>
-              <a:t>11/10/2018</a:t>
+              <a:t>11/11/2018</a:t>
             </a:fld>
             <a:endParaRPr lang="en-US"/>
           </a:p>
@@ -910,7 +910,7 @@
           <a:p>
             <a:fld id="{78C97017-6FC3-485B-9764-EAC9E56C1D49}" type="datetimeFigureOut">
               <a:rPr lang="en-US" smtClean="0"/>
-              <a:t>11/10/2018</a:t>
+              <a:t>11/11/2018</a:t>
             </a:fld>
             <a:endParaRPr lang="en-US"/>
           </a:p>
@@ -1088,7 +1088,7 @@
           <a:p>
             <a:fld id="{78C97017-6FC3-485B-9764-EAC9E56C1D49}" type="datetimeFigureOut">
               <a:rPr lang="en-US" smtClean="0"/>
-              <a:t>11/10/2018</a:t>
+              <a:t>11/11/2018</a:t>
             </a:fld>
             <a:endParaRPr lang="en-US"/>
           </a:p>
@@ -1256,7 +1256,7 @@
           <a:p>
             <a:fld id="{78C97017-6FC3-485B-9764-EAC9E56C1D49}" type="datetimeFigureOut">
               <a:rPr lang="en-US" smtClean="0"/>
-              <a:t>11/10/2018</a:t>
+              <a:t>11/11/2018</a:t>
             </a:fld>
             <a:endParaRPr lang="en-US"/>
           </a:p>
@@ -1501,7 +1501,7 @@
           <a:p>
             <a:fld id="{78C97017-6FC3-485B-9764-EAC9E56C1D49}" type="datetimeFigureOut">
               <a:rPr lang="en-US" smtClean="0"/>
-              <a:t>11/10/2018</a:t>
+              <a:t>11/11/2018</a:t>
             </a:fld>
             <a:endParaRPr lang="en-US"/>
           </a:p>
@@ -1786,7 +1786,7 @@
           <a:p>
             <a:fld id="{78C97017-6FC3-485B-9764-EAC9E56C1D49}" type="datetimeFigureOut">
               <a:rPr lang="en-US" smtClean="0"/>
-              <a:t>11/10/2018</a:t>
+              <a:t>11/11/2018</a:t>
             </a:fld>
             <a:endParaRPr lang="en-US"/>
           </a:p>
@@ -2205,7 +2205,7 @@
           <a:p>
             <a:fld id="{78C97017-6FC3-485B-9764-EAC9E56C1D49}" type="datetimeFigureOut">
               <a:rPr lang="en-US" smtClean="0"/>
-              <a:t>11/10/2018</a:t>
+              <a:t>11/11/2018</a:t>
             </a:fld>
             <a:endParaRPr lang="en-US"/>
           </a:p>
@@ -2322,7 +2322,7 @@
           <a:p>
             <a:fld id="{78C97017-6FC3-485B-9764-EAC9E56C1D49}" type="datetimeFigureOut">
               <a:rPr lang="en-US" smtClean="0"/>
-              <a:t>11/10/2018</a:t>
+              <a:t>11/11/2018</a:t>
             </a:fld>
             <a:endParaRPr lang="en-US"/>
           </a:p>
@@ -2417,7 +2417,7 @@
           <a:p>
             <a:fld id="{78C97017-6FC3-485B-9764-EAC9E56C1D49}" type="datetimeFigureOut">
               <a:rPr lang="en-US" smtClean="0"/>
-              <a:t>11/10/2018</a:t>
+              <a:t>11/11/2018</a:t>
             </a:fld>
             <a:endParaRPr lang="en-US"/>
           </a:p>
@@ -2692,7 +2692,7 @@
           <a:p>
             <a:fld id="{78C97017-6FC3-485B-9764-EAC9E56C1D49}" type="datetimeFigureOut">
               <a:rPr lang="en-US" smtClean="0"/>
-              <a:t>11/10/2018</a:t>
+              <a:t>11/11/2018</a:t>
             </a:fld>
             <a:endParaRPr lang="en-US"/>
           </a:p>
@@ -2944,7 +2944,7 @@
           <a:p>
             <a:fld id="{78C97017-6FC3-485B-9764-EAC9E56C1D49}" type="datetimeFigureOut">
               <a:rPr lang="en-US" smtClean="0"/>
-              <a:t>11/10/2018</a:t>
+              <a:t>11/11/2018</a:t>
             </a:fld>
             <a:endParaRPr lang="en-US"/>
           </a:p>
@@ -3155,7 +3155,7 @@
           <a:p>
             <a:fld id="{78C97017-6FC3-485B-9764-EAC9E56C1D49}" type="datetimeFigureOut">
               <a:rPr lang="en-US" smtClean="0"/>
-              <a:t>11/10/2018</a:t>
+              <a:t>11/11/2018</a:t>
             </a:fld>
             <a:endParaRPr lang="en-US"/>
           </a:p>
@@ -3649,7 +3649,7 @@
         </p:nvSpPr>
         <p:spPr>
           <a:xfrm>
-            <a:off x="1922098" y="5263112"/>
+            <a:off x="1922098" y="5158968"/>
             <a:ext cx="1447801" cy="304800"/>
           </a:xfrm>
           <a:prstGeom prst="roundRect">
@@ -3791,7 +3791,7 @@
         </p:nvSpPr>
         <p:spPr>
           <a:xfrm>
-            <a:off x="1922097" y="5842232"/>
+            <a:off x="1922098" y="5726454"/>
             <a:ext cx="1447801" cy="487680"/>
           </a:xfrm>
           <a:prstGeom prst="roundRect">
@@ -3961,11 +3961,7 @@
             <a:pPr algn="ctr"/>
             <a:r>
               <a:rPr lang="en-US" sz="1200" dirty="0" smtClean="0"/>
-              <a:t>Restore tokenizer </a:t>
-            </a:r>
-            <a:r>
-              <a:rPr lang="en-US" sz="1200" dirty="0" smtClean="0"/>
-              <a:t>position</a:t>
+              <a:t>Restore tokenizer position</a:t>
             </a:r>
             <a:endParaRPr lang="en-SG" sz="1200" dirty="0"/>
           </a:p>
@@ -3979,8 +3975,8 @@
         </p:nvSpPr>
         <p:spPr>
           <a:xfrm>
-            <a:off x="-9525" y="5681809"/>
-            <a:ext cx="1538664" cy="517702"/>
+            <a:off x="-9525" y="5726453"/>
+            <a:ext cx="1538664" cy="487679"/>
           </a:xfrm>
           <a:prstGeom prst="roundRect">
             <a:avLst/>
@@ -4007,11 +4003,7 @@
             <a:pPr algn="ctr"/>
             <a:r>
               <a:rPr lang="en-US" sz="1200" dirty="0" smtClean="0"/>
-              <a:t>Raise an </a:t>
-            </a:r>
-            <a:r>
-              <a:rPr lang="en-US" sz="1200" dirty="0" smtClean="0"/>
-              <a:t>error (throw an exception)</a:t>
+              <a:t>Raise an error (throw an exception)</a:t>
             </a:r>
             <a:endParaRPr lang="en-SG" sz="1200" dirty="0"/>
           </a:p>
@@ -4282,7 +4274,7 @@
         </p:nvSpPr>
         <p:spPr>
           <a:xfrm>
-            <a:off x="4784345" y="5726454"/>
+            <a:off x="4784345" y="5732379"/>
             <a:ext cx="2104603" cy="814554"/>
           </a:xfrm>
           <a:prstGeom prst="roundRect">
@@ -4310,7 +4302,7 @@
             <a:pPr algn="ctr"/>
             <a:r>
               <a:rPr lang="en-US" sz="1200" dirty="0" smtClean="0"/>
-              <a:t>Create predicate from field identifier, operator 1 (as field operator), and test phrase</a:t>
+              <a:t>Create predicate from field identifier, operator 1 (as filter operator), and test phrase</a:t>
             </a:r>
             <a:endParaRPr lang="en-SG" sz="1200" dirty="0"/>
           </a:p>
@@ -4366,8 +4358,8 @@
         </p:nvSpPr>
         <p:spPr>
           <a:xfrm>
-            <a:off x="7671810" y="5732379"/>
-            <a:ext cx="2104603" cy="814554"/>
+            <a:off x="7644666" y="5732379"/>
+            <a:ext cx="2157990" cy="814554"/>
           </a:xfrm>
           <a:prstGeom prst="roundRect">
             <a:avLst/>
@@ -4394,7 +4386,7 @@
             <a:pPr algn="ctr"/>
             <a:r>
               <a:rPr lang="en-US" sz="1200" dirty="0" smtClean="0"/>
-              <a:t>Create predicate from field identifier, operator 1 (as set operator), operator 2 (as field operator), and test phrase</a:t>
+              <a:t>Create predicate from field identifier, operator 1 (as set operator), operator 2 (as filter operator), and test phrase</a:t>
             </a:r>
             <a:endParaRPr lang="en-SG" sz="1200" dirty="0"/>
           </a:p>
@@ -4863,8 +4855,8 @@
         </p:nvCxnSpPr>
         <p:spPr>
           <a:xfrm flipH="1">
-            <a:off x="8724112" y="5459916"/>
-            <a:ext cx="1" cy="272463"/>
+            <a:off x="8723661" y="5459916"/>
+            <a:ext cx="452" cy="272463"/>
           </a:xfrm>
           <a:prstGeom prst="straightConnector1">
             <a:avLst/>
@@ -5108,42 +5100,6 @@
       </p:cxnSp>
       <p:cxnSp>
         <p:nvCxnSpPr>
-          <p:cNvPr id="84" name="Elbow Connector 83"/>
-          <p:cNvCxnSpPr>
-            <a:stCxn id="15" idx="3"/>
-            <a:endCxn id="12" idx="0"/>
-          </p:cNvCxnSpPr>
-          <p:nvPr/>
-        </p:nvCxnSpPr>
-        <p:spPr>
-          <a:xfrm>
-            <a:off x="990600" y="4191000"/>
-            <a:ext cx="1655399" cy="1072112"/>
-          </a:xfrm>
-          <a:prstGeom prst="bentConnector2">
-            <a:avLst/>
-          </a:prstGeom>
-          <a:ln w="19050">
-            <a:tailEnd type="triangle"/>
-          </a:ln>
-        </p:spPr>
-        <p:style>
-          <a:lnRef idx="1">
-            <a:schemeClr val="dk1"/>
-          </a:lnRef>
-          <a:fillRef idx="0">
-            <a:schemeClr val="dk1"/>
-          </a:fillRef>
-          <a:effectRef idx="0">
-            <a:schemeClr val="dk1"/>
-          </a:effectRef>
-          <a:fontRef idx="minor">
-            <a:schemeClr val="tx1"/>
-          </a:fontRef>
-        </p:style>
-      </p:cxnSp>
-      <p:cxnSp>
-        <p:nvCxnSpPr>
           <p:cNvPr id="86" name="Straight Arrow Connector 85"/>
           <p:cNvCxnSpPr>
             <a:stCxn id="12" idx="2"/>
@@ -5152,47 +5108,11 @@
           <p:nvPr/>
         </p:nvCxnSpPr>
         <p:spPr>
-          <a:xfrm flipH="1">
-            <a:off x="2645998" y="5567912"/>
-            <a:ext cx="1" cy="274320"/>
+          <a:xfrm>
+            <a:off x="2645999" y="5463768"/>
+            <a:ext cx="0" cy="262686"/>
           </a:xfrm>
           <a:prstGeom prst="straightConnector1">
-            <a:avLst/>
-          </a:prstGeom>
-          <a:ln w="19050">
-            <a:tailEnd type="triangle"/>
-          </a:ln>
-        </p:spPr>
-        <p:style>
-          <a:lnRef idx="1">
-            <a:schemeClr val="dk1"/>
-          </a:lnRef>
-          <a:fillRef idx="0">
-            <a:schemeClr val="dk1"/>
-          </a:fillRef>
-          <a:effectRef idx="0">
-            <a:schemeClr val="dk1"/>
-          </a:effectRef>
-          <a:fontRef idx="minor">
-            <a:schemeClr val="tx1"/>
-          </a:fontRef>
-        </p:style>
-      </p:cxnSp>
-      <p:cxnSp>
-        <p:nvCxnSpPr>
-          <p:cNvPr id="92" name="Elbow Connector 91"/>
-          <p:cNvCxnSpPr>
-            <a:stCxn id="39" idx="3"/>
-            <a:endCxn id="29" idx="0"/>
-          </p:cNvCxnSpPr>
-          <p:nvPr/>
-        </p:nvCxnSpPr>
-        <p:spPr>
-          <a:xfrm>
-            <a:off x="3827099" y="4558077"/>
-            <a:ext cx="2009549" cy="600942"/>
-          </a:xfrm>
-          <a:prstGeom prst="bentConnector2">
             <a:avLst/>
           </a:prstGeom>
           <a:ln w="19050">
@@ -5226,7 +5146,7 @@
         <p:spPr>
           <a:xfrm flipH="1">
             <a:off x="5836647" y="5463819"/>
-            <a:ext cx="1" cy="262635"/>
+            <a:ext cx="1" cy="268560"/>
           </a:xfrm>
           <a:prstGeom prst="straightConnector1">
             <a:avLst/>
@@ -5410,7 +5330,7 @@
         <p:spPr>
           <a:xfrm flipH="1">
             <a:off x="759807" y="5155116"/>
-            <a:ext cx="2193" cy="526693"/>
+            <a:ext cx="2193" cy="571337"/>
           </a:xfrm>
           <a:prstGeom prst="straightConnector1">
             <a:avLst/>
@@ -5571,8 +5491,8 @@
         </p:nvCxnSpPr>
         <p:spPr>
           <a:xfrm flipH="1">
-            <a:off x="5836646" y="6541008"/>
-            <a:ext cx="1" cy="219023"/>
+            <a:off x="5836646" y="6546933"/>
+            <a:ext cx="1" cy="213098"/>
           </a:xfrm>
           <a:prstGeom prst="straightConnector1">
             <a:avLst/>
@@ -5607,8 +5527,8 @@
         </p:nvCxnSpPr>
         <p:spPr>
           <a:xfrm rot="16200000" flipH="1">
-            <a:off x="3797663" y="5178247"/>
-            <a:ext cx="658719" cy="2962048"/>
+            <a:off x="3739774" y="5120358"/>
+            <a:ext cx="774497" cy="2962047"/>
           </a:xfrm>
           <a:prstGeom prst="bentConnector2">
             <a:avLst/>
@@ -5643,8 +5563,8 @@
         </p:nvCxnSpPr>
         <p:spPr>
           <a:xfrm rot="5400000">
-            <a:off x="7173830" y="5438349"/>
-            <a:ext cx="441698" cy="2658866"/>
+            <a:off x="7173605" y="5438575"/>
+            <a:ext cx="441698" cy="2658415"/>
           </a:xfrm>
           <a:prstGeom prst="bentConnector2">
             <a:avLst/>
@@ -5947,8 +5867,8 @@
         </p:nvCxnSpPr>
         <p:spPr>
           <a:xfrm rot="16200000" flipH="1">
-            <a:off x="2461242" y="4498075"/>
-            <a:ext cx="1445369" cy="4848239"/>
+            <a:off x="2468552" y="4505386"/>
+            <a:ext cx="1430748" cy="4848239"/>
           </a:xfrm>
           <a:prstGeom prst="bentConnector2">
             <a:avLst/>
@@ -5972,6 +5892,354 @@
           </a:fontRef>
         </p:style>
       </p:cxnSp>
+      <p:sp>
+        <p:nvSpPr>
+          <p:cNvPr id="11" name="Rectangle 10"/>
+          <p:cNvSpPr/>
+          <p:nvPr/>
+        </p:nvSpPr>
+        <p:spPr>
+          <a:xfrm>
+            <a:off x="2586463" y="4506272"/>
+            <a:ext cx="121839" cy="120617"/>
+          </a:xfrm>
+          <a:prstGeom prst="rect">
+            <a:avLst/>
+          </a:prstGeom>
+          <a:solidFill>
+            <a:schemeClr val="bg1"/>
+          </a:solidFill>
+          <a:ln>
+            <a:noFill/>
+          </a:ln>
+        </p:spPr>
+        <p:style>
+          <a:lnRef idx="2">
+            <a:schemeClr val="accent1">
+              <a:shade val="50000"/>
+            </a:schemeClr>
+          </a:lnRef>
+          <a:fillRef idx="1">
+            <a:schemeClr val="accent1"/>
+          </a:fillRef>
+          <a:effectRef idx="0">
+            <a:schemeClr val="accent1"/>
+          </a:effectRef>
+          <a:fontRef idx="minor">
+            <a:schemeClr val="lt1"/>
+          </a:fontRef>
+        </p:style>
+        <p:txBody>
+          <a:bodyPr rtlCol="0" anchor="ctr"/>
+          <a:lstStyle/>
+          <a:p>
+            <a:pPr algn="ctr"/>
+            <a:endParaRPr lang="en-SG"/>
+          </a:p>
+        </p:txBody>
+      </p:sp>
+      <p:sp>
+        <p:nvSpPr>
+          <p:cNvPr id="73" name="Rectangle 72"/>
+          <p:cNvSpPr/>
+          <p:nvPr/>
+        </p:nvSpPr>
+        <p:spPr>
+          <a:xfrm>
+            <a:off x="2586462" y="4873575"/>
+            <a:ext cx="121839" cy="120617"/>
+          </a:xfrm>
+          <a:prstGeom prst="rect">
+            <a:avLst/>
+          </a:prstGeom>
+          <a:solidFill>
+            <a:schemeClr val="bg1"/>
+          </a:solidFill>
+          <a:ln>
+            <a:noFill/>
+          </a:ln>
+        </p:spPr>
+        <p:style>
+          <a:lnRef idx="2">
+            <a:schemeClr val="accent1">
+              <a:shade val="50000"/>
+            </a:schemeClr>
+          </a:lnRef>
+          <a:fillRef idx="1">
+            <a:schemeClr val="accent1"/>
+          </a:fillRef>
+          <a:effectRef idx="0">
+            <a:schemeClr val="accent1"/>
+          </a:effectRef>
+          <a:fontRef idx="minor">
+            <a:schemeClr val="lt1"/>
+          </a:fontRef>
+        </p:style>
+        <p:txBody>
+          <a:bodyPr rtlCol="0" anchor="ctr"/>
+          <a:lstStyle/>
+          <a:p>
+            <a:pPr algn="ctr"/>
+            <a:endParaRPr lang="en-SG"/>
+          </a:p>
+        </p:txBody>
+      </p:sp>
+      <p:cxnSp>
+        <p:nvCxnSpPr>
+          <p:cNvPr id="84" name="Elbow Connector 83"/>
+          <p:cNvCxnSpPr>
+            <a:stCxn id="15" idx="3"/>
+            <a:endCxn id="12" idx="0"/>
+          </p:cNvCxnSpPr>
+          <p:nvPr/>
+        </p:nvCxnSpPr>
+        <p:spPr>
+          <a:xfrm>
+            <a:off x="990600" y="4191000"/>
+            <a:ext cx="1655399" cy="967968"/>
+          </a:xfrm>
+          <a:prstGeom prst="bentConnector2">
+            <a:avLst/>
+          </a:prstGeom>
+          <a:ln w="19050">
+            <a:tailEnd type="triangle"/>
+          </a:ln>
+        </p:spPr>
+        <p:style>
+          <a:lnRef idx="1">
+            <a:schemeClr val="dk1"/>
+          </a:lnRef>
+          <a:fillRef idx="0">
+            <a:schemeClr val="dk1"/>
+          </a:fillRef>
+          <a:effectRef idx="0">
+            <a:schemeClr val="dk1"/>
+          </a:effectRef>
+          <a:fontRef idx="minor">
+            <a:schemeClr val="tx1"/>
+          </a:fontRef>
+        </p:style>
+      </p:cxnSp>
+      <p:sp>
+        <p:nvSpPr>
+          <p:cNvPr id="5" name="Arc 4"/>
+          <p:cNvSpPr/>
+          <p:nvPr/>
+        </p:nvSpPr>
+        <p:spPr>
+          <a:xfrm>
+            <a:off x="2586462" y="4507819"/>
+            <a:ext cx="119071" cy="119071"/>
+          </a:xfrm>
+          <a:prstGeom prst="arc">
+            <a:avLst>
+              <a:gd name="adj1" fmla="val 10864831"/>
+              <a:gd name="adj2" fmla="val 0"/>
+            </a:avLst>
+          </a:prstGeom>
+          <a:ln w="19050">
+            <a:solidFill>
+              <a:schemeClr val="tx1"/>
+            </a:solidFill>
+          </a:ln>
+        </p:spPr>
+        <p:style>
+          <a:lnRef idx="1">
+            <a:schemeClr val="accent1"/>
+          </a:lnRef>
+          <a:fillRef idx="0">
+            <a:schemeClr val="accent1"/>
+          </a:fillRef>
+          <a:effectRef idx="0">
+            <a:schemeClr val="accent1"/>
+          </a:effectRef>
+          <a:fontRef idx="minor">
+            <a:schemeClr val="tx1"/>
+          </a:fontRef>
+        </p:style>
+        <p:txBody>
+          <a:bodyPr rtlCol="0" anchor="ctr"/>
+          <a:lstStyle/>
+          <a:p>
+            <a:pPr algn="ctr"/>
+            <a:endParaRPr lang="en-SG"/>
+          </a:p>
+        </p:txBody>
+      </p:sp>
+      <p:sp>
+        <p:nvSpPr>
+          <p:cNvPr id="75" name="Arc 74"/>
+          <p:cNvSpPr/>
+          <p:nvPr/>
+        </p:nvSpPr>
+        <p:spPr>
+          <a:xfrm>
+            <a:off x="2586461" y="4875122"/>
+            <a:ext cx="119071" cy="119071"/>
+          </a:xfrm>
+          <a:prstGeom prst="arc">
+            <a:avLst>
+              <a:gd name="adj1" fmla="val 10864831"/>
+              <a:gd name="adj2" fmla="val 0"/>
+            </a:avLst>
+          </a:prstGeom>
+          <a:ln w="19050">
+            <a:solidFill>
+              <a:schemeClr val="tx1"/>
+            </a:solidFill>
+          </a:ln>
+        </p:spPr>
+        <p:style>
+          <a:lnRef idx="1">
+            <a:schemeClr val="accent1"/>
+          </a:lnRef>
+          <a:fillRef idx="0">
+            <a:schemeClr val="accent1"/>
+          </a:fillRef>
+          <a:effectRef idx="0">
+            <a:schemeClr val="accent1"/>
+          </a:effectRef>
+          <a:fontRef idx="minor">
+            <a:schemeClr val="tx1"/>
+          </a:fontRef>
+        </p:style>
+        <p:txBody>
+          <a:bodyPr rtlCol="0" anchor="ctr"/>
+          <a:lstStyle/>
+          <a:p>
+            <a:pPr algn="ctr"/>
+            <a:endParaRPr lang="en-SG"/>
+          </a:p>
+        </p:txBody>
+      </p:sp>
+      <p:sp>
+        <p:nvSpPr>
+          <p:cNvPr id="76" name="Rectangle 75"/>
+          <p:cNvSpPr/>
+          <p:nvPr/>
+        </p:nvSpPr>
+        <p:spPr>
+          <a:xfrm>
+            <a:off x="5775726" y="4873235"/>
+            <a:ext cx="121839" cy="120617"/>
+          </a:xfrm>
+          <a:prstGeom prst="rect">
+            <a:avLst/>
+          </a:prstGeom>
+          <a:solidFill>
+            <a:schemeClr val="bg1"/>
+          </a:solidFill>
+          <a:ln>
+            <a:noFill/>
+          </a:ln>
+        </p:spPr>
+        <p:style>
+          <a:lnRef idx="2">
+            <a:schemeClr val="accent1">
+              <a:shade val="50000"/>
+            </a:schemeClr>
+          </a:lnRef>
+          <a:fillRef idx="1">
+            <a:schemeClr val="accent1"/>
+          </a:fillRef>
+          <a:effectRef idx="0">
+            <a:schemeClr val="accent1"/>
+          </a:effectRef>
+          <a:fontRef idx="minor">
+            <a:schemeClr val="lt1"/>
+          </a:fontRef>
+        </p:style>
+        <p:txBody>
+          <a:bodyPr rtlCol="0" anchor="ctr"/>
+          <a:lstStyle/>
+          <a:p>
+            <a:pPr algn="ctr"/>
+            <a:endParaRPr lang="en-SG"/>
+          </a:p>
+        </p:txBody>
+      </p:sp>
+      <p:cxnSp>
+        <p:nvCxnSpPr>
+          <p:cNvPr id="92" name="Elbow Connector 91"/>
+          <p:cNvCxnSpPr>
+            <a:stCxn id="39" idx="3"/>
+            <a:endCxn id="29" idx="0"/>
+          </p:cNvCxnSpPr>
+          <p:nvPr/>
+        </p:nvCxnSpPr>
+        <p:spPr>
+          <a:xfrm>
+            <a:off x="3827099" y="4558077"/>
+            <a:ext cx="2009549" cy="600942"/>
+          </a:xfrm>
+          <a:prstGeom prst="bentConnector2">
+            <a:avLst/>
+          </a:prstGeom>
+          <a:ln w="19050">
+            <a:tailEnd type="triangle"/>
+          </a:ln>
+        </p:spPr>
+        <p:style>
+          <a:lnRef idx="1">
+            <a:schemeClr val="dk1"/>
+          </a:lnRef>
+          <a:fillRef idx="0">
+            <a:schemeClr val="dk1"/>
+          </a:fillRef>
+          <a:effectRef idx="0">
+            <a:schemeClr val="dk1"/>
+          </a:effectRef>
+          <a:fontRef idx="minor">
+            <a:schemeClr val="tx1"/>
+          </a:fontRef>
+        </p:style>
+      </p:cxnSp>
+      <p:sp>
+        <p:nvSpPr>
+          <p:cNvPr id="77" name="Arc 76"/>
+          <p:cNvSpPr/>
+          <p:nvPr/>
+        </p:nvSpPr>
+        <p:spPr>
+          <a:xfrm>
+            <a:off x="5775725" y="4874782"/>
+            <a:ext cx="119071" cy="119071"/>
+          </a:xfrm>
+          <a:prstGeom prst="arc">
+            <a:avLst>
+              <a:gd name="adj1" fmla="val 10864831"/>
+              <a:gd name="adj2" fmla="val 0"/>
+            </a:avLst>
+          </a:prstGeom>
+          <a:ln w="19050">
+            <a:solidFill>
+              <a:schemeClr val="tx1"/>
+            </a:solidFill>
+          </a:ln>
+        </p:spPr>
+        <p:style>
+          <a:lnRef idx="1">
+            <a:schemeClr val="accent1"/>
+          </a:lnRef>
+          <a:fillRef idx="0">
+            <a:schemeClr val="accent1"/>
+          </a:fillRef>
+          <a:effectRef idx="0">
+            <a:schemeClr val="accent1"/>
+          </a:effectRef>
+          <a:fontRef idx="minor">
+            <a:schemeClr val="tx1"/>
+          </a:fontRef>
+        </p:style>
+        <p:txBody>
+          <a:bodyPr rtlCol="0" anchor="ctr"/>
+          <a:lstStyle/>
+          <a:p>
+            <a:pPr algn="ctr"/>
+            <a:endParaRPr lang="en-SG"/>
+          </a:p>
+        </p:txBody>
+      </p:sp>
     </p:spTree>
     <p:extLst>
       <p:ext uri="{BB962C8B-B14F-4D97-AF65-F5344CB8AC3E}">

</xml_diff>